<commit_message>
added drawing for double hop slide
</commit_message>
<xml_diff>
--- a/powerpoints/slides3.pptx
+++ b/powerpoints/slides3.pptx
@@ -229,7 +229,7 @@
           <a:p>
             <a:fld id="{4E57A49D-DB6B-4E1C-B12C-B1822F46F86A}" type="datetimeFigureOut">
               <a:rPr lang="en-US" smtClean="0"/>
-              <a:t>4/3/2019</a:t>
+              <a:t>4/22/2019</a:t>
             </a:fld>
             <a:endParaRPr lang="en-US"/>
           </a:p>
@@ -711,7 +711,7 @@
             <a:fld id="{B61BEF0D-F0BB-DE4B-95CE-6DB70DBA9567}" type="datetimeFigureOut">
               <a:rPr lang="en-US" smtClean="0"/>
               <a:pPr/>
-              <a:t>4/3/2019</a:t>
+              <a:t>4/22/2019</a:t>
             </a:fld>
             <a:endParaRPr lang="en-US" dirty="0"/>
           </a:p>
@@ -1291,7 +1291,7 @@
             <a:fld id="{B61BEF0D-F0BB-DE4B-95CE-6DB70DBA9567}" type="datetimeFigureOut">
               <a:rPr lang="en-US" smtClean="0"/>
               <a:pPr/>
-              <a:t>4/3/2019</a:t>
+              <a:t>4/22/2019</a:t>
             </a:fld>
             <a:endParaRPr lang="en-US" dirty="0"/>
           </a:p>
@@ -1533,7 +1533,7 @@
             <a:fld id="{B61BEF0D-F0BB-DE4B-95CE-6DB70DBA9567}" type="datetimeFigureOut">
               <a:rPr lang="en-US" smtClean="0"/>
               <a:pPr/>
-              <a:t>4/3/2019</a:t>
+              <a:t>4/22/2019</a:t>
             </a:fld>
             <a:endParaRPr lang="en-US" dirty="0"/>
           </a:p>
@@ -1789,7 +1789,7 @@
             <a:fld id="{B61BEF0D-F0BB-DE4B-95CE-6DB70DBA9567}" type="datetimeFigureOut">
               <a:rPr lang="en-US" smtClean="0"/>
               <a:pPr/>
-              <a:t>4/3/2019</a:t>
+              <a:t>4/22/2019</a:t>
             </a:fld>
             <a:endParaRPr lang="en-US" dirty="0"/>
           </a:p>
@@ -2150,7 +2150,7 @@
             <a:fld id="{B61BEF0D-F0BB-DE4B-95CE-6DB70DBA9567}" type="datetimeFigureOut">
               <a:rPr lang="en-US" smtClean="0"/>
               <a:pPr/>
-              <a:t>4/3/2019</a:t>
+              <a:t>4/22/2019</a:t>
             </a:fld>
             <a:endParaRPr lang="en-US" dirty="0"/>
           </a:p>
@@ -2264,7 +2264,7 @@
             <a:fld id="{B61BEF0D-F0BB-DE4B-95CE-6DB70DBA9567}" type="datetimeFigureOut">
               <a:rPr lang="en-US" smtClean="0"/>
               <a:pPr/>
-              <a:t>4/3/2019</a:t>
+              <a:t>4/22/2019</a:t>
             </a:fld>
             <a:endParaRPr lang="en-US" dirty="0"/>
           </a:p>
@@ -2356,7 +2356,7 @@
             <a:fld id="{B61BEF0D-F0BB-DE4B-95CE-6DB70DBA9567}" type="datetimeFigureOut">
               <a:rPr lang="en-US" smtClean="0"/>
               <a:pPr/>
-              <a:t>4/3/2019</a:t>
+              <a:t>4/22/2019</a:t>
             </a:fld>
             <a:endParaRPr lang="en-US" dirty="0"/>
           </a:p>
@@ -2628,7 +2628,7 @@
             <a:fld id="{B61BEF0D-F0BB-DE4B-95CE-6DB70DBA9567}" type="datetimeFigureOut">
               <a:rPr lang="en-US" smtClean="0"/>
               <a:pPr/>
-              <a:t>4/3/2019</a:t>
+              <a:t>4/22/2019</a:t>
             </a:fld>
             <a:endParaRPr lang="en-US" dirty="0"/>
           </a:p>
@@ -2877,7 +2877,7 @@
             <a:fld id="{B61BEF0D-F0BB-DE4B-95CE-6DB70DBA9567}" type="datetimeFigureOut">
               <a:rPr lang="en-US" smtClean="0"/>
               <a:pPr/>
-              <a:t>4/3/2019</a:t>
+              <a:t>4/22/2019</a:t>
             </a:fld>
             <a:endParaRPr lang="en-US" dirty="0"/>
           </a:p>
@@ -3085,7 +3085,7 @@
             <a:fld id="{B61BEF0D-F0BB-DE4B-95CE-6DB70DBA9567}" type="datetimeFigureOut">
               <a:rPr lang="en-US" smtClean="0"/>
               <a:pPr/>
-              <a:t>4/3/2019</a:t>
+              <a:t>4/22/2019</a:t>
             </a:fld>
             <a:endParaRPr lang="en-US" dirty="0"/>
           </a:p>
@@ -5147,34 +5147,6 @@
       </p:sp>
       <p:sp>
         <p:nvSpPr>
-          <p:cNvPr id="3" name="Content Placeholder 2">
-            <a:extLst>
-              <a:ext uri="{FF2B5EF4-FFF2-40B4-BE49-F238E27FC236}">
-                <a16:creationId xmlns:a16="http://schemas.microsoft.com/office/drawing/2014/main" id="{C4C07AAC-CC73-4AE8-BCBA-6200E6FCB907}"/>
-              </a:ext>
-            </a:extLst>
-          </p:cNvPr>
-          <p:cNvSpPr>
-            <a:spLocks noGrp="1"/>
-          </p:cNvSpPr>
-          <p:nvPr>
-            <p:ph idx="1"/>
-          </p:nvPr>
-        </p:nvSpPr>
-        <p:spPr/>
-        <p:txBody>
-          <a:bodyPr/>
-          <a:lstStyle/>
-          <a:p>
-            <a:r>
-              <a:rPr lang="en-US" dirty="0"/>
-              <a:t>//TODO add diagram of ansible node to “windows jump box” to AD</a:t>
-            </a:r>
-          </a:p>
-        </p:txBody>
-      </p:sp>
-      <p:sp>
-        <p:nvSpPr>
           <p:cNvPr id="4" name="Footer Placeholder 3">
             <a:extLst>
               <a:ext uri="{FF2B5EF4-FFF2-40B4-BE49-F238E27FC236}">
@@ -5209,6 +5181,32 @@
           </a:p>
         </p:txBody>
       </p:sp>
+      <p:pic>
+        <p:nvPicPr>
+          <p:cNvPr id="11" name="Content Placeholder 10"/>
+          <p:cNvPicPr>
+            <a:picLocks noGrp="1" noChangeAspect="1"/>
+          </p:cNvPicPr>
+          <p:nvPr>
+            <p:ph idx="1"/>
+          </p:nvPr>
+        </p:nvPicPr>
+        <p:blipFill>
+          <a:blip r:embed="rId3"/>
+          <a:stretch>
+            <a:fillRect/>
+          </a:stretch>
+        </p:blipFill>
+        <p:spPr>
+          <a:xfrm>
+            <a:off x="2742431" y="1521547"/>
+            <a:ext cx="6715606" cy="4563885"/>
+          </a:xfrm>
+          <a:prstGeom prst="rect">
+            <a:avLst/>
+          </a:prstGeom>
+        </p:spPr>
+      </p:pic>
     </p:spTree>
     <p:extLst>
       <p:ext uri="{BB962C8B-B14F-4D97-AF65-F5344CB8AC3E}">
@@ -6581,6 +6579,18 @@
                       </a:r>
                     </a:p>
                     <a:p>
+                      <a:r>
+                        <a:rPr lang="en-US" sz="1800" b="0" kern="1200" dirty="0">
+                          <a:solidFill>
+                            <a:schemeClr val="dk1"/>
+                          </a:solidFill>
+                          <a:effectLst/>
+                          <a:latin typeface="+mn-lt"/>
+                          <a:ea typeface="+mn-ea"/>
+                          <a:cs typeface="+mn-cs"/>
+                        </a:rPr>
+                        <a:t/>
+                      </a:r>
                       <a:br>
                         <a:rPr lang="en-US" sz="1800" b="0" kern="1200" dirty="0">
                           <a:solidFill>

</xml_diff>